<commit_message>
Add fonts and logos
</commit_message>
<xml_diff>
--- a/TupleBrandStandards.pptx
+++ b/TupleBrandStandards.pptx
@@ -263,7 +263,7 @@
           <a:p>
             <a:fld id="{A4B95748-7583-476C-A01D-71A59B6EB51C}" type="datetimeFigureOut">
               <a:rPr lang="en-US" smtClean="0"/>
-              <a:t>7/12/2019</a:t>
+              <a:t>8/16/19</a:t>
             </a:fld>
             <a:endParaRPr lang="en-US"/>
           </a:p>
@@ -461,7 +461,7 @@
           <a:p>
             <a:fld id="{A4B95748-7583-476C-A01D-71A59B6EB51C}" type="datetimeFigureOut">
               <a:rPr lang="en-US" smtClean="0"/>
-              <a:t>7/12/2019</a:t>
+              <a:t>8/16/19</a:t>
             </a:fld>
             <a:endParaRPr lang="en-US"/>
           </a:p>
@@ -669,7 +669,7 @@
           <a:p>
             <a:fld id="{A4B95748-7583-476C-A01D-71A59B6EB51C}" type="datetimeFigureOut">
               <a:rPr lang="en-US" smtClean="0"/>
-              <a:t>7/12/2019</a:t>
+              <a:t>8/16/19</a:t>
             </a:fld>
             <a:endParaRPr lang="en-US"/>
           </a:p>
@@ -867,7 +867,7 @@
           <a:p>
             <a:fld id="{A4B95748-7583-476C-A01D-71A59B6EB51C}" type="datetimeFigureOut">
               <a:rPr lang="en-US" smtClean="0"/>
-              <a:t>7/12/2019</a:t>
+              <a:t>8/16/19</a:t>
             </a:fld>
             <a:endParaRPr lang="en-US"/>
           </a:p>
@@ -1142,7 +1142,7 @@
           <a:p>
             <a:fld id="{A4B95748-7583-476C-A01D-71A59B6EB51C}" type="datetimeFigureOut">
               <a:rPr lang="en-US" smtClean="0"/>
-              <a:t>7/12/2019</a:t>
+              <a:t>8/16/19</a:t>
             </a:fld>
             <a:endParaRPr lang="en-US"/>
           </a:p>
@@ -1407,7 +1407,7 @@
           <a:p>
             <a:fld id="{A4B95748-7583-476C-A01D-71A59B6EB51C}" type="datetimeFigureOut">
               <a:rPr lang="en-US" smtClean="0"/>
-              <a:t>7/12/2019</a:t>
+              <a:t>8/16/19</a:t>
             </a:fld>
             <a:endParaRPr lang="en-US"/>
           </a:p>
@@ -1819,7 +1819,7 @@
           <a:p>
             <a:fld id="{A4B95748-7583-476C-A01D-71A59B6EB51C}" type="datetimeFigureOut">
               <a:rPr lang="en-US" smtClean="0"/>
-              <a:t>7/12/2019</a:t>
+              <a:t>8/16/19</a:t>
             </a:fld>
             <a:endParaRPr lang="en-US"/>
           </a:p>
@@ -1960,7 +1960,7 @@
           <a:p>
             <a:fld id="{A4B95748-7583-476C-A01D-71A59B6EB51C}" type="datetimeFigureOut">
               <a:rPr lang="en-US" smtClean="0"/>
-              <a:t>7/12/2019</a:t>
+              <a:t>8/16/19</a:t>
             </a:fld>
             <a:endParaRPr lang="en-US"/>
           </a:p>
@@ -2073,7 +2073,7 @@
           <a:p>
             <a:fld id="{A4B95748-7583-476C-A01D-71A59B6EB51C}" type="datetimeFigureOut">
               <a:rPr lang="en-US" smtClean="0"/>
-              <a:t>7/12/2019</a:t>
+              <a:t>8/16/19</a:t>
             </a:fld>
             <a:endParaRPr lang="en-US"/>
           </a:p>
@@ -2384,7 +2384,7 @@
           <a:p>
             <a:fld id="{A4B95748-7583-476C-A01D-71A59B6EB51C}" type="datetimeFigureOut">
               <a:rPr lang="en-US" smtClean="0"/>
-              <a:t>7/12/2019</a:t>
+              <a:t>8/16/19</a:t>
             </a:fld>
             <a:endParaRPr lang="en-US"/>
           </a:p>
@@ -2672,7 +2672,7 @@
           <a:p>
             <a:fld id="{A4B95748-7583-476C-A01D-71A59B6EB51C}" type="datetimeFigureOut">
               <a:rPr lang="en-US" smtClean="0"/>
-              <a:t>7/12/2019</a:t>
+              <a:t>8/16/19</a:t>
             </a:fld>
             <a:endParaRPr lang="en-US"/>
           </a:p>
@@ -2913,7 +2913,7 @@
           <a:p>
             <a:fld id="{A4B95748-7583-476C-A01D-71A59B6EB51C}" type="datetimeFigureOut">
               <a:rPr lang="en-US" smtClean="0"/>
-              <a:t>7/12/2019</a:t>
+              <a:t>8/16/19</a:t>
             </a:fld>
             <a:endParaRPr lang="en-US"/>
           </a:p>
@@ -7031,6 +7031,21 @@
             <a:endParaRPr lang="en-US" dirty="0"/>
           </a:p>
           <a:p>
+            <a:pPr marL="0" indent="0">
+              <a:buNone/>
+            </a:pPr>
+            <a:r>
+              <a:rPr lang="en-US" dirty="0">
+                <a:hlinkClick r:id="rId5"/>
+              </a:rPr>
+              <a:t>http://patternico.com/#5Tn2ZygDom388J96</a:t>
+            </a:r>
+            <a:endParaRPr lang="en-US" dirty="0"/>
+          </a:p>
+          <a:p>
+            <a:pPr marL="0" indent="0">
+              <a:buNone/>
+            </a:pPr>
             <a:endParaRPr lang="en-US" dirty="0"/>
           </a:p>
         </p:txBody>

</xml_diff>